<commit_message>
(fase1): Se realiza avances en Acta, carta gantt, plantilla de requerimiento, presentacion
</commit_message>
<xml_diff>
--- a/fase1/Documentacion Grupal/Estructura Presentación 1-Capstone.pptx
+++ b/fase1/Documentacion Grupal/Estructura Presentación 1-Capstone.pptx
@@ -5,7 +5,7 @@
     <p:sldMasterId id="2147483648" r:id="rId1"/>
   </p:sldMasterIdLst>
   <p:notesMasterIdLst>
-    <p:notesMasterId r:id="rId16"/>
+    <p:notesMasterId r:id="rId15"/>
   </p:notesMasterIdLst>
   <p:sldIdLst>
     <p:sldId id="256" r:id="rId2"/>
@@ -17,11 +17,10 @@
     <p:sldId id="287" r:id="rId8"/>
     <p:sldId id="261" r:id="rId9"/>
     <p:sldId id="288" r:id="rId10"/>
-    <p:sldId id="289" r:id="rId11"/>
-    <p:sldId id="278" r:id="rId12"/>
-    <p:sldId id="279" r:id="rId13"/>
-    <p:sldId id="276" r:id="rId14"/>
-    <p:sldId id="286" r:id="rId15"/>
+    <p:sldId id="278" r:id="rId11"/>
+    <p:sldId id="279" r:id="rId12"/>
+    <p:sldId id="276" r:id="rId13"/>
+    <p:sldId id="286" r:id="rId14"/>
   </p:sldIdLst>
   <p:sldSz cx="12192000" cy="6858000"/>
   <p:notesSz cx="6858000" cy="9144000"/>
@@ -3105,7 +3104,7 @@
           <a:p>
             <a:fld id="{5AAB0916-E07D-42EB-9C54-2314ADA0F462}" type="datetimeFigureOut">
               <a:rPr lang="es-CL" smtClean="0"/>
-              <a:t>21-08-2025</a:t>
+              <a:t>28-08-2025</a:t>
             </a:fld>
             <a:endParaRPr lang="es-CL"/>
           </a:p>
@@ -3588,7 +3587,7 @@
           <a:p>
             <a:fld id="{C56040A3-26B0-41B9-8D0E-A6E2BE76A0F6}" type="datetimeFigureOut">
               <a:rPr lang="es-CL" smtClean="0"/>
-              <a:t>21-08-2025</a:t>
+              <a:t>28-08-2025</a:t>
             </a:fld>
             <a:endParaRPr lang="es-CL"/>
           </a:p>
@@ -3758,7 +3757,7 @@
           <a:p>
             <a:fld id="{C56040A3-26B0-41B9-8D0E-A6E2BE76A0F6}" type="datetimeFigureOut">
               <a:rPr lang="es-CL" smtClean="0"/>
-              <a:t>21-08-2025</a:t>
+              <a:t>28-08-2025</a:t>
             </a:fld>
             <a:endParaRPr lang="es-CL"/>
           </a:p>
@@ -3938,7 +3937,7 @@
           <a:p>
             <a:fld id="{C56040A3-26B0-41B9-8D0E-A6E2BE76A0F6}" type="datetimeFigureOut">
               <a:rPr lang="es-CL" smtClean="0"/>
-              <a:t>21-08-2025</a:t>
+              <a:t>28-08-2025</a:t>
             </a:fld>
             <a:endParaRPr lang="es-CL"/>
           </a:p>
@@ -4108,7 +4107,7 @@
           <a:p>
             <a:fld id="{C56040A3-26B0-41B9-8D0E-A6E2BE76A0F6}" type="datetimeFigureOut">
               <a:rPr lang="es-CL" smtClean="0"/>
-              <a:t>21-08-2025</a:t>
+              <a:t>28-08-2025</a:t>
             </a:fld>
             <a:endParaRPr lang="es-CL"/>
           </a:p>
@@ -4354,7 +4353,7 @@
           <a:p>
             <a:fld id="{C56040A3-26B0-41B9-8D0E-A6E2BE76A0F6}" type="datetimeFigureOut">
               <a:rPr lang="es-CL" smtClean="0"/>
-              <a:t>21-08-2025</a:t>
+              <a:t>28-08-2025</a:t>
             </a:fld>
             <a:endParaRPr lang="es-CL"/>
           </a:p>
@@ -4586,7 +4585,7 @@
           <a:p>
             <a:fld id="{C56040A3-26B0-41B9-8D0E-A6E2BE76A0F6}" type="datetimeFigureOut">
               <a:rPr lang="es-CL" smtClean="0"/>
-              <a:t>21-08-2025</a:t>
+              <a:t>28-08-2025</a:t>
             </a:fld>
             <a:endParaRPr lang="es-CL"/>
           </a:p>
@@ -4953,7 +4952,7 @@
           <a:p>
             <a:fld id="{C56040A3-26B0-41B9-8D0E-A6E2BE76A0F6}" type="datetimeFigureOut">
               <a:rPr lang="es-CL" smtClean="0"/>
-              <a:t>21-08-2025</a:t>
+              <a:t>28-08-2025</a:t>
             </a:fld>
             <a:endParaRPr lang="es-CL"/>
           </a:p>
@@ -5071,7 +5070,7 @@
           <a:p>
             <a:fld id="{C56040A3-26B0-41B9-8D0E-A6E2BE76A0F6}" type="datetimeFigureOut">
               <a:rPr lang="es-CL" smtClean="0"/>
-              <a:t>21-08-2025</a:t>
+              <a:t>28-08-2025</a:t>
             </a:fld>
             <a:endParaRPr lang="es-CL"/>
           </a:p>
@@ -5166,7 +5165,7 @@
           <a:p>
             <a:fld id="{C56040A3-26B0-41B9-8D0E-A6E2BE76A0F6}" type="datetimeFigureOut">
               <a:rPr lang="es-CL" smtClean="0"/>
-              <a:t>21-08-2025</a:t>
+              <a:t>28-08-2025</a:t>
             </a:fld>
             <a:endParaRPr lang="es-CL"/>
           </a:p>
@@ -5443,7 +5442,7 @@
           <a:p>
             <a:fld id="{C56040A3-26B0-41B9-8D0E-A6E2BE76A0F6}" type="datetimeFigureOut">
               <a:rPr lang="es-CL" smtClean="0"/>
-              <a:t>21-08-2025</a:t>
+              <a:t>28-08-2025</a:t>
             </a:fld>
             <a:endParaRPr lang="es-CL"/>
           </a:p>
@@ -5696,7 +5695,7 @@
           <a:p>
             <a:fld id="{C56040A3-26B0-41B9-8D0E-A6E2BE76A0F6}" type="datetimeFigureOut">
               <a:rPr lang="es-CL" smtClean="0"/>
-              <a:t>21-08-2025</a:t>
+              <a:t>28-08-2025</a:t>
             </a:fld>
             <a:endParaRPr lang="es-CL"/>
           </a:p>
@@ -5918,7 +5917,7 @@
           <a:p>
             <a:fld id="{C56040A3-26B0-41B9-8D0E-A6E2BE76A0F6}" type="datetimeFigureOut">
               <a:rPr lang="es-CL" smtClean="0"/>
-              <a:t>21-08-2025</a:t>
+              <a:t>28-08-2025</a:t>
             </a:fld>
             <a:endParaRPr lang="es-CL"/>
           </a:p>
@@ -6430,196 +6429,6 @@
 </file>
 
 <file path=ppt/slides/slide10.xml><?xml version="1.0" encoding="utf-8"?>
-<p:sld xmlns:a="http://schemas.openxmlformats.org/drawingml/2006/main" xmlns:r="http://schemas.openxmlformats.org/officeDocument/2006/relationships" xmlns:p="http://schemas.openxmlformats.org/presentationml/2006/main">
-  <p:cSld>
-    <p:spTree>
-      <p:nvGrpSpPr>
-        <p:cNvPr id="1" name="">
-          <a:extLst>
-            <a:ext uri="{FF2B5EF4-FFF2-40B4-BE49-F238E27FC236}">
-              <a16:creationId xmlns:a16="http://schemas.microsoft.com/office/drawing/2014/main" id="{0BD6A37F-BFE1-224D-0063-F0FDC29A17D0}"/>
-            </a:ext>
-          </a:extLst>
-        </p:cNvPr>
-        <p:cNvGrpSpPr/>
-        <p:nvPr/>
-      </p:nvGrpSpPr>
-      <p:grpSpPr>
-        <a:xfrm>
-          <a:off x="0" y="0"/>
-          <a:ext cx="0" cy="0"/>
-          <a:chOff x="0" y="0"/>
-          <a:chExt cx="0" cy="0"/>
-        </a:xfrm>
-      </p:grpSpPr>
-      <p:sp>
-        <p:nvSpPr>
-          <p:cNvPr id="4" name="Título 3">
-            <a:extLst>
-              <a:ext uri="{FF2B5EF4-FFF2-40B4-BE49-F238E27FC236}">
-                <a16:creationId xmlns:a16="http://schemas.microsoft.com/office/drawing/2014/main" id="{0AAD239D-FB6E-94D9-972B-F5AC557A05A7}"/>
-              </a:ext>
-            </a:extLst>
-          </p:cNvPr>
-          <p:cNvSpPr>
-            <a:spLocks noGrp="1"/>
-          </p:cNvSpPr>
-          <p:nvPr>
-            <p:ph type="title"/>
-          </p:nvPr>
-        </p:nvSpPr>
-        <p:spPr>
-          <a:xfrm>
-            <a:off x="641252" y="1068511"/>
-            <a:ext cx="10515600" cy="520804"/>
-          </a:xfrm>
-        </p:spPr>
-        <p:txBody>
-          <a:bodyPr>
-            <a:normAutofit fontScale="90000"/>
-          </a:bodyPr>
-          <a:lstStyle/>
-          <a:p>
-            <a:r>
-              <a:rPr lang="es-CL" dirty="0"/>
-              <a:t>Mockups del Sistema</a:t>
-            </a:r>
-          </a:p>
-        </p:txBody>
-      </p:sp>
-      <p:sp>
-        <p:nvSpPr>
-          <p:cNvPr id="5" name="CuadroTexto 4">
-            <a:extLst>
-              <a:ext uri="{FF2B5EF4-FFF2-40B4-BE49-F238E27FC236}">
-                <a16:creationId xmlns:a16="http://schemas.microsoft.com/office/drawing/2014/main" id="{F11473DB-DBAA-D988-63D2-E114AE1CF0B7}"/>
-              </a:ext>
-            </a:extLst>
-          </p:cNvPr>
-          <p:cNvSpPr txBox="1"/>
-          <p:nvPr/>
-        </p:nvSpPr>
-        <p:spPr>
-          <a:xfrm>
-            <a:off x="757367" y="1848356"/>
-            <a:ext cx="9990462" cy="1754326"/>
-          </a:xfrm>
-          <a:prstGeom prst="rect">
-            <a:avLst/>
-          </a:prstGeom>
-          <a:noFill/>
-        </p:spPr>
-        <p:txBody>
-          <a:bodyPr wrap="square" rtlCol="0">
-            <a:spAutoFit/>
-          </a:bodyPr>
-          <a:lstStyle/>
-          <a:p>
-            <a:endParaRPr lang="es-CL" dirty="0"/>
-          </a:p>
-          <a:p>
-            <a:endParaRPr lang="es-CL" dirty="0"/>
-          </a:p>
-          <a:p>
-            <a:endParaRPr lang="es-CL" dirty="0"/>
-          </a:p>
-          <a:p>
-            <a:endParaRPr lang="es-CL" dirty="0"/>
-          </a:p>
-          <a:p>
-            <a:endParaRPr lang="es-CL" dirty="0"/>
-          </a:p>
-          <a:p>
-            <a:endParaRPr lang="es-CL" dirty="0"/>
-          </a:p>
-        </p:txBody>
-      </p:sp>
-      <p:pic>
-        <p:nvPicPr>
-          <p:cNvPr id="6" name="Imagen 5" descr="Interfaz de usuario gráfica, Texto, Aplicación, Chat o mensaje de texto&#10;&#10;El contenido generado por IA puede ser incorrecto.">
-            <a:extLst>
-              <a:ext uri="{FF2B5EF4-FFF2-40B4-BE49-F238E27FC236}">
-                <a16:creationId xmlns:a16="http://schemas.microsoft.com/office/drawing/2014/main" id="{AF385584-2126-61B4-6BF2-2B9012C399C0}"/>
-              </a:ext>
-            </a:extLst>
-          </p:cNvPr>
-          <p:cNvPicPr>
-            <a:picLocks noChangeAspect="1"/>
-          </p:cNvPicPr>
-          <p:nvPr/>
-        </p:nvPicPr>
-        <p:blipFill>
-          <a:blip r:embed="rId2">
-            <a:extLst>
-              <a:ext uri="{28A0092B-C50C-407E-A947-70E740481C1C}">
-                <a14:useLocalDpi xmlns:a14="http://schemas.microsoft.com/office/drawing/2010/main" val="0"/>
-              </a:ext>
-            </a:extLst>
-          </a:blip>
-          <a:stretch>
-            <a:fillRect/>
-          </a:stretch>
-        </p:blipFill>
-        <p:spPr>
-          <a:xfrm>
-            <a:off x="6554204" y="2566410"/>
-            <a:ext cx="3223079" cy="3223079"/>
-          </a:xfrm>
-          <a:prstGeom prst="rect">
-            <a:avLst/>
-          </a:prstGeom>
-        </p:spPr>
-      </p:pic>
-      <p:pic>
-        <p:nvPicPr>
-          <p:cNvPr id="11" name="Imagen 10" descr="Interfaz de usuario gráfica, Texto, Aplicación, Chat o mensaje de texto&#10;&#10;El contenido generado por IA puede ser incorrecto.">
-            <a:extLst>
-              <a:ext uri="{FF2B5EF4-FFF2-40B4-BE49-F238E27FC236}">
-                <a16:creationId xmlns:a16="http://schemas.microsoft.com/office/drawing/2014/main" id="{381661F4-2E4C-6784-A9F3-F831B26AA9ED}"/>
-              </a:ext>
-            </a:extLst>
-          </p:cNvPr>
-          <p:cNvPicPr>
-            <a:picLocks noChangeAspect="1"/>
-          </p:cNvPicPr>
-          <p:nvPr/>
-        </p:nvPicPr>
-        <p:blipFill>
-          <a:blip r:embed="rId3">
-            <a:extLst>
-              <a:ext uri="{28A0092B-C50C-407E-A947-70E740481C1C}">
-                <a14:useLocalDpi xmlns:a14="http://schemas.microsoft.com/office/drawing/2010/main" val="0"/>
-              </a:ext>
-            </a:extLst>
-          </a:blip>
-          <a:stretch>
-            <a:fillRect/>
-          </a:stretch>
-        </p:blipFill>
-        <p:spPr>
-          <a:xfrm>
-            <a:off x="2663371" y="2566410"/>
-            <a:ext cx="3223079" cy="3223079"/>
-          </a:xfrm>
-          <a:prstGeom prst="rect">
-            <a:avLst/>
-          </a:prstGeom>
-        </p:spPr>
-      </p:pic>
-    </p:spTree>
-    <p:extLst>
-      <p:ext uri="{BB962C8B-B14F-4D97-AF65-F5344CB8AC3E}">
-        <p14:creationId xmlns:p14="http://schemas.microsoft.com/office/powerpoint/2010/main" val="23547582"/>
-      </p:ext>
-    </p:extLst>
-  </p:cSld>
-  <p:clrMapOvr>
-    <a:masterClrMapping/>
-  </p:clrMapOvr>
-</p:sld>
-</file>
-
-<file path=ppt/slides/slide11.xml><?xml version="1.0" encoding="utf-8"?>
 <p:sld xmlns:a="http://schemas.openxmlformats.org/drawingml/2006/main" xmlns:r="http://schemas.openxmlformats.org/officeDocument/2006/relationships" xmlns:p="http://schemas.openxmlformats.org/presentationml/2006/main">
   <p:cSld>
     <p:spTree>
@@ -7123,7 +6932,7 @@
 </p:sld>
 </file>
 
-<file path=ppt/slides/slide12.xml><?xml version="1.0" encoding="utf-8"?>
+<file path=ppt/slides/slide11.xml><?xml version="1.0" encoding="utf-8"?>
 <p:sld xmlns:a="http://schemas.openxmlformats.org/drawingml/2006/main" xmlns:r="http://schemas.openxmlformats.org/officeDocument/2006/relationships" xmlns:p="http://schemas.openxmlformats.org/presentationml/2006/main">
   <p:cSld>
     <p:spTree>
@@ -7929,7 +7738,7 @@
 </p:sld>
 </file>
 
-<file path=ppt/slides/slide13.xml><?xml version="1.0" encoding="utf-8"?>
+<file path=ppt/slides/slide12.xml><?xml version="1.0" encoding="utf-8"?>
 <p:sld xmlns:a="http://schemas.openxmlformats.org/drawingml/2006/main" xmlns:r="http://schemas.openxmlformats.org/officeDocument/2006/relationships" xmlns:p="http://schemas.openxmlformats.org/presentationml/2006/main">
   <p:cSld>
     <p:spTree>
@@ -8744,7 +8553,7 @@
 </p:sld>
 </file>
 
-<file path=ppt/slides/slide14.xml><?xml version="1.0" encoding="utf-8"?>
+<file path=ppt/slides/slide13.xml><?xml version="1.0" encoding="utf-8"?>
 <p:sld xmlns:a="http://schemas.openxmlformats.org/drawingml/2006/main" xmlns:r="http://schemas.openxmlformats.org/officeDocument/2006/relationships" xmlns:p="http://schemas.openxmlformats.org/presentationml/2006/main">
   <p:cSld>
     <p:spTree>
@@ -11198,135 +11007,258 @@
           </a:p>
         </p:txBody>
       </p:sp>
-      <p:grpSp>
-        <p:nvGrpSpPr>
-          <p:cNvPr id="10" name="Grupo 9">
+      <p:pic>
+        <p:nvPicPr>
+          <p:cNvPr id="6" name="Imagen 5" descr="Imagen que contiene Texto&#10;&#10;El contenido generado por IA puede ser incorrecto.">
             <a:extLst>
               <a:ext uri="{FF2B5EF4-FFF2-40B4-BE49-F238E27FC236}">
-                <a16:creationId xmlns:a16="http://schemas.microsoft.com/office/drawing/2014/main" id="{0CF50FD4-FADB-E725-D95A-18F978DC5C60}"/>
+                <a16:creationId xmlns:a16="http://schemas.microsoft.com/office/drawing/2014/main" id="{11A7CE76-6864-BB7A-2E36-FF4335709CC4}"/>
               </a:ext>
             </a:extLst>
           </p:cNvPr>
-          <p:cNvGrpSpPr/>
+          <p:cNvPicPr>
+            <a:picLocks noChangeAspect="1"/>
+          </p:cNvPicPr>
           <p:nvPr/>
-        </p:nvGrpSpPr>
-        <p:grpSpPr>
+        </p:nvPicPr>
+        <p:blipFill>
+          <a:blip r:embed="rId2">
+            <a:extLst>
+              <a:ext uri="{28A0092B-C50C-407E-A947-70E740481C1C}">
+                <a14:useLocalDpi xmlns:a14="http://schemas.microsoft.com/office/drawing/2010/main" val="0"/>
+              </a:ext>
+            </a:extLst>
+          </a:blip>
+          <a:stretch>
+            <a:fillRect/>
+          </a:stretch>
+        </p:blipFill>
+        <p:spPr>
           <a:xfrm>
-            <a:off x="986026" y="2480773"/>
-            <a:ext cx="10372347" cy="3080116"/>
-            <a:chOff x="757367" y="3530145"/>
-            <a:chExt cx="10372347" cy="3080116"/>
+            <a:off x="8041202" y="3023020"/>
+            <a:ext cx="2766469" cy="2766469"/>
           </a:xfrm>
-        </p:grpSpPr>
-        <p:pic>
-          <p:nvPicPr>
-            <p:cNvPr id="3" name="Imagen 2" descr="Interfaz de usuario gráfica, Texto, Aplicación, Chat o mensaje de texto&#10;&#10;El contenido generado por IA puede ser incorrecto.">
-              <a:extLst>
-                <a:ext uri="{FF2B5EF4-FFF2-40B4-BE49-F238E27FC236}">
-                  <a16:creationId xmlns:a16="http://schemas.microsoft.com/office/drawing/2014/main" id="{F0AC8E20-AAA6-BC45-7335-0F5C7A22250B}"/>
-                </a:ext>
-              </a:extLst>
-            </p:cNvPr>
-            <p:cNvPicPr>
-              <a:picLocks noChangeAspect="1"/>
-            </p:cNvPicPr>
-            <p:nvPr/>
-          </p:nvPicPr>
-          <p:blipFill>
-            <a:blip r:embed="rId2">
-              <a:extLst>
-                <a:ext uri="{28A0092B-C50C-407E-A947-70E740481C1C}">
-                  <a14:useLocalDpi xmlns:a14="http://schemas.microsoft.com/office/drawing/2010/main" val="0"/>
-                </a:ext>
-              </a:extLst>
-            </a:blip>
-            <a:stretch>
-              <a:fillRect/>
-            </a:stretch>
-          </p:blipFill>
-          <p:spPr>
-            <a:xfrm>
-              <a:off x="757367" y="3530146"/>
-              <a:ext cx="3080115" cy="3080115"/>
-            </a:xfrm>
-            <a:prstGeom prst="rect">
-              <a:avLst/>
-            </a:prstGeom>
-          </p:spPr>
-        </p:pic>
-        <p:pic>
-          <p:nvPicPr>
-            <p:cNvPr id="7" name="Imagen 6" descr="Interfaz de usuario gráfica&#10;&#10;El contenido generado por IA puede ser incorrecto.">
-              <a:extLst>
-                <a:ext uri="{FF2B5EF4-FFF2-40B4-BE49-F238E27FC236}">
-                  <a16:creationId xmlns:a16="http://schemas.microsoft.com/office/drawing/2014/main" id="{C07CF1A3-5070-5D3C-3A10-505A00DD910A}"/>
-                </a:ext>
-              </a:extLst>
-            </p:cNvPr>
-            <p:cNvPicPr>
-              <a:picLocks noChangeAspect="1"/>
-            </p:cNvPicPr>
-            <p:nvPr/>
-          </p:nvPicPr>
-          <p:blipFill>
-            <a:blip r:embed="rId3">
-              <a:extLst>
-                <a:ext uri="{28A0092B-C50C-407E-A947-70E740481C1C}">
-                  <a14:useLocalDpi xmlns:a14="http://schemas.microsoft.com/office/drawing/2010/main" val="0"/>
-                </a:ext>
-              </a:extLst>
-            </a:blip>
-            <a:stretch>
-              <a:fillRect/>
-            </a:stretch>
-          </p:blipFill>
-          <p:spPr>
-            <a:xfrm>
-              <a:off x="4403483" y="3530145"/>
-              <a:ext cx="3080115" cy="3080115"/>
-            </a:xfrm>
-            <a:prstGeom prst="rect">
-              <a:avLst/>
-            </a:prstGeom>
-          </p:spPr>
-        </p:pic>
-        <p:pic>
-          <p:nvPicPr>
-            <p:cNvPr id="9" name="Imagen 8" descr="Interfaz de usuario gráfica, Texto, Aplicación, Chat o mensaje de texto&#10;&#10;El contenido generado por IA puede ser incorrecto.">
-              <a:extLst>
-                <a:ext uri="{FF2B5EF4-FFF2-40B4-BE49-F238E27FC236}">
-                  <a16:creationId xmlns:a16="http://schemas.microsoft.com/office/drawing/2014/main" id="{870BFAC4-EE31-F741-D134-98012288B3BE}"/>
-                </a:ext>
-              </a:extLst>
-            </p:cNvPr>
-            <p:cNvPicPr>
-              <a:picLocks noChangeAspect="1"/>
-            </p:cNvPicPr>
-            <p:nvPr/>
-          </p:nvPicPr>
-          <p:blipFill>
-            <a:blip r:embed="rId4">
-              <a:extLst>
-                <a:ext uri="{28A0092B-C50C-407E-A947-70E740481C1C}">
-                  <a14:useLocalDpi xmlns:a14="http://schemas.microsoft.com/office/drawing/2010/main" val="0"/>
-                </a:ext>
-              </a:extLst>
-            </a:blip>
-            <a:stretch>
-              <a:fillRect/>
-            </a:stretch>
-          </p:blipFill>
-          <p:spPr>
-            <a:xfrm>
-              <a:off x="8049599" y="3530145"/>
-              <a:ext cx="3080115" cy="3080115"/>
-            </a:xfrm>
-            <a:prstGeom prst="rect">
-              <a:avLst/>
-            </a:prstGeom>
-          </p:spPr>
-        </p:pic>
-      </p:grpSp>
+          <a:prstGeom prst="rect">
+            <a:avLst/>
+          </a:prstGeom>
+        </p:spPr>
+      </p:pic>
+      <p:pic>
+        <p:nvPicPr>
+          <p:cNvPr id="11" name="Imagen 10" descr="Interfaz de usuario gráfica, Texto, Aplicación&#10;&#10;El contenido generado por IA puede ser incorrecto.">
+            <a:extLst>
+              <a:ext uri="{FF2B5EF4-FFF2-40B4-BE49-F238E27FC236}">
+                <a16:creationId xmlns:a16="http://schemas.microsoft.com/office/drawing/2014/main" id="{888ADCCE-9A62-5FFD-71B9-8959AE423879}"/>
+              </a:ext>
+            </a:extLst>
+          </p:cNvPr>
+          <p:cNvPicPr>
+            <a:picLocks noChangeAspect="1"/>
+          </p:cNvPicPr>
+          <p:nvPr/>
+        </p:nvPicPr>
+        <p:blipFill>
+          <a:blip r:embed="rId3" cstate="print">
+            <a:extLst>
+              <a:ext uri="{28A0092B-C50C-407E-A947-70E740481C1C}">
+                <a14:useLocalDpi xmlns:a14="http://schemas.microsoft.com/office/drawing/2010/main" val="0"/>
+              </a:ext>
+            </a:extLst>
+          </a:blip>
+          <a:stretch>
+            <a:fillRect/>
+          </a:stretch>
+        </p:blipFill>
+        <p:spPr>
+          <a:xfrm>
+            <a:off x="5409618" y="4323889"/>
+            <a:ext cx="2061543" cy="2061543"/>
+          </a:xfrm>
+          <a:prstGeom prst="rect">
+            <a:avLst/>
+          </a:prstGeom>
+        </p:spPr>
+      </p:pic>
+      <p:pic>
+        <p:nvPicPr>
+          <p:cNvPr id="13" name="Imagen 12" descr="Interfaz de usuario gráfica, Texto, Aplicación&#10;&#10;El contenido generado por IA puede ser incorrecto.">
+            <a:extLst>
+              <a:ext uri="{FF2B5EF4-FFF2-40B4-BE49-F238E27FC236}">
+                <a16:creationId xmlns:a16="http://schemas.microsoft.com/office/drawing/2014/main" id="{53550416-3D92-7DFC-341E-C328D24B5403}"/>
+              </a:ext>
+            </a:extLst>
+          </p:cNvPr>
+          <p:cNvPicPr>
+            <a:picLocks noChangeAspect="1"/>
+          </p:cNvPicPr>
+          <p:nvPr/>
+        </p:nvPicPr>
+        <p:blipFill>
+          <a:blip r:embed="rId4" cstate="print">
+            <a:extLst>
+              <a:ext uri="{28A0092B-C50C-407E-A947-70E740481C1C}">
+                <a14:useLocalDpi xmlns:a14="http://schemas.microsoft.com/office/drawing/2010/main" val="0"/>
+              </a:ext>
+            </a:extLst>
+          </a:blip>
+          <a:stretch>
+            <a:fillRect/>
+          </a:stretch>
+        </p:blipFill>
+        <p:spPr>
+          <a:xfrm>
+            <a:off x="5409618" y="2190865"/>
+            <a:ext cx="2061543" cy="2061543"/>
+          </a:xfrm>
+          <a:prstGeom prst="rect">
+            <a:avLst/>
+          </a:prstGeom>
+        </p:spPr>
+      </p:pic>
+      <p:pic>
+        <p:nvPicPr>
+          <p:cNvPr id="15" name="Imagen 14" descr="Interfaz de usuario gráfica, Texto, Aplicación&#10;&#10;El contenido generado por IA puede ser incorrecto.">
+            <a:extLst>
+              <a:ext uri="{FF2B5EF4-FFF2-40B4-BE49-F238E27FC236}">
+                <a16:creationId xmlns:a16="http://schemas.microsoft.com/office/drawing/2014/main" id="{7928457B-6624-F782-78CA-1D816497E938}"/>
+              </a:ext>
+            </a:extLst>
+          </p:cNvPr>
+          <p:cNvPicPr>
+            <a:picLocks noChangeAspect="1"/>
+          </p:cNvPicPr>
+          <p:nvPr/>
+        </p:nvPicPr>
+        <p:blipFill>
+          <a:blip r:embed="rId5" cstate="print">
+            <a:extLst>
+              <a:ext uri="{28A0092B-C50C-407E-A947-70E740481C1C}">
+                <a14:useLocalDpi xmlns:a14="http://schemas.microsoft.com/office/drawing/2010/main" val="0"/>
+              </a:ext>
+            </a:extLst>
+          </a:blip>
+          <a:stretch>
+            <a:fillRect/>
+          </a:stretch>
+        </p:blipFill>
+        <p:spPr>
+          <a:xfrm>
+            <a:off x="3151766" y="4323889"/>
+            <a:ext cx="2061543" cy="2061543"/>
+          </a:xfrm>
+          <a:prstGeom prst="rect">
+            <a:avLst/>
+          </a:prstGeom>
+        </p:spPr>
+      </p:pic>
+      <p:pic>
+        <p:nvPicPr>
+          <p:cNvPr id="17" name="Imagen 16" descr="Interfaz de usuario gráfica, Texto, Aplicación&#10;&#10;El contenido generado por IA puede ser incorrecto.">
+            <a:extLst>
+              <a:ext uri="{FF2B5EF4-FFF2-40B4-BE49-F238E27FC236}">
+                <a16:creationId xmlns:a16="http://schemas.microsoft.com/office/drawing/2014/main" id="{43045621-6A36-F221-997B-7B28C32C1AC8}"/>
+              </a:ext>
+            </a:extLst>
+          </p:cNvPr>
+          <p:cNvPicPr>
+            <a:picLocks noChangeAspect="1"/>
+          </p:cNvPicPr>
+          <p:nvPr/>
+        </p:nvPicPr>
+        <p:blipFill>
+          <a:blip r:embed="rId6" cstate="print">
+            <a:extLst>
+              <a:ext uri="{28A0092B-C50C-407E-A947-70E740481C1C}">
+                <a14:useLocalDpi xmlns:a14="http://schemas.microsoft.com/office/drawing/2010/main" val="0"/>
+              </a:ext>
+            </a:extLst>
+          </a:blip>
+          <a:stretch>
+            <a:fillRect/>
+          </a:stretch>
+        </p:blipFill>
+        <p:spPr>
+          <a:xfrm>
+            <a:off x="3146223" y="2173572"/>
+            <a:ext cx="2061543" cy="2061543"/>
+          </a:xfrm>
+          <a:prstGeom prst="rect">
+            <a:avLst/>
+          </a:prstGeom>
+        </p:spPr>
+      </p:pic>
+      <p:pic>
+        <p:nvPicPr>
+          <p:cNvPr id="19" name="Imagen 18" descr="Interfaz de usuario gráfica, Texto, Aplicación, Chat o mensaje de texto&#10;&#10;El contenido generado por IA puede ser incorrecto.">
+            <a:extLst>
+              <a:ext uri="{FF2B5EF4-FFF2-40B4-BE49-F238E27FC236}">
+                <a16:creationId xmlns:a16="http://schemas.microsoft.com/office/drawing/2014/main" id="{FF0D2F30-9200-F121-B4BE-3C802862CBBD}"/>
+              </a:ext>
+            </a:extLst>
+          </p:cNvPr>
+          <p:cNvPicPr>
+            <a:picLocks noChangeAspect="1"/>
+          </p:cNvPicPr>
+          <p:nvPr/>
+        </p:nvPicPr>
+        <p:blipFill>
+          <a:blip r:embed="rId7" cstate="print">
+            <a:extLst>
+              <a:ext uri="{28A0092B-C50C-407E-A947-70E740481C1C}">
+                <a14:useLocalDpi xmlns:a14="http://schemas.microsoft.com/office/drawing/2010/main" val="0"/>
+              </a:ext>
+            </a:extLst>
+          </a:blip>
+          <a:stretch>
+            <a:fillRect/>
+          </a:stretch>
+        </p:blipFill>
+        <p:spPr>
+          <a:xfrm>
+            <a:off x="945149" y="4323889"/>
+            <a:ext cx="2061543" cy="2061543"/>
+          </a:xfrm>
+          <a:prstGeom prst="rect">
+            <a:avLst/>
+          </a:prstGeom>
+        </p:spPr>
+      </p:pic>
+      <p:pic>
+        <p:nvPicPr>
+          <p:cNvPr id="21" name="Imagen 20" descr="Interfaz de usuario gráfica, Texto, Aplicación, Chat o mensaje de texto&#10;&#10;El contenido generado por IA puede ser incorrecto.">
+            <a:extLst>
+              <a:ext uri="{FF2B5EF4-FFF2-40B4-BE49-F238E27FC236}">
+                <a16:creationId xmlns:a16="http://schemas.microsoft.com/office/drawing/2014/main" id="{B6888233-BCE0-9F69-E472-6953820642A3}"/>
+              </a:ext>
+            </a:extLst>
+          </p:cNvPr>
+          <p:cNvPicPr>
+            <a:picLocks noChangeAspect="1"/>
+          </p:cNvPicPr>
+          <p:nvPr/>
+        </p:nvPicPr>
+        <p:blipFill>
+          <a:blip r:embed="rId8" cstate="print">
+            <a:extLst>
+              <a:ext uri="{28A0092B-C50C-407E-A947-70E740481C1C}">
+                <a14:useLocalDpi xmlns:a14="http://schemas.microsoft.com/office/drawing/2010/main" val="0"/>
+              </a:ext>
+            </a:extLst>
+          </a:blip>
+          <a:stretch>
+            <a:fillRect/>
+          </a:stretch>
+        </p:blipFill>
+        <p:spPr>
+          <a:xfrm>
+            <a:off x="945149" y="2173572"/>
+            <a:ext cx="2061543" cy="2061543"/>
+          </a:xfrm>
+          <a:prstGeom prst="rect">
+            <a:avLst/>
+          </a:prstGeom>
+        </p:spPr>
+      </p:pic>
     </p:spTree>
     <p:extLst>
       <p:ext uri="{BB962C8B-B14F-4D97-AF65-F5344CB8AC3E}">
@@ -11348,7 +11280,7 @@
         <p:cNvPr id="1" name="">
           <a:extLst>
             <a:ext uri="{FF2B5EF4-FFF2-40B4-BE49-F238E27FC236}">
-              <a16:creationId xmlns:a16="http://schemas.microsoft.com/office/drawing/2014/main" id="{7A745758-17A3-CA78-82D5-15B3DAA887AD}"/>
+              <a16:creationId xmlns:a16="http://schemas.microsoft.com/office/drawing/2014/main" id="{98528CCD-36CC-F033-58CC-E97DDEB01473}"/>
             </a:ext>
           </a:extLst>
         </p:cNvPr>
@@ -11368,7 +11300,7 @@
           <p:cNvPr id="4" name="Título 3">
             <a:extLst>
               <a:ext uri="{FF2B5EF4-FFF2-40B4-BE49-F238E27FC236}">
-                <a16:creationId xmlns:a16="http://schemas.microsoft.com/office/drawing/2014/main" id="{268E136C-5019-90F9-8E34-D8D948AE7E32}"/>
+                <a16:creationId xmlns:a16="http://schemas.microsoft.com/office/drawing/2014/main" id="{630E00E2-76B5-37AD-7FA5-25EDD99AA180}"/>
               </a:ext>
             </a:extLst>
           </p:cNvPr>
@@ -11398,186 +11330,334 @@
           </a:p>
         </p:txBody>
       </p:sp>
-      <p:sp>
-        <p:nvSpPr>
-          <p:cNvPr id="5" name="CuadroTexto 4">
+      <p:pic>
+        <p:nvPicPr>
+          <p:cNvPr id="8" name="Imagen 7" descr="Interfaz de usuario gráfica, Texto, Aplicación, Chat o mensaje de texto&#10;&#10;El contenido generado por IA puede ser incorrecto.">
             <a:extLst>
               <a:ext uri="{FF2B5EF4-FFF2-40B4-BE49-F238E27FC236}">
-                <a16:creationId xmlns:a16="http://schemas.microsoft.com/office/drawing/2014/main" id="{562922EE-3E04-8B6D-B7A9-B756AFA333C1}"/>
+                <a16:creationId xmlns:a16="http://schemas.microsoft.com/office/drawing/2014/main" id="{7F1A9D73-745D-C3F8-04AF-29A5E4536F3A}"/>
               </a:ext>
             </a:extLst>
           </p:cNvPr>
-          <p:cNvSpPr txBox="1"/>
+          <p:cNvPicPr>
+            <a:picLocks noChangeAspect="1"/>
+          </p:cNvPicPr>
           <p:nvPr/>
-        </p:nvSpPr>
+        </p:nvPicPr>
+        <p:blipFill>
+          <a:blip r:embed="rId2" cstate="print">
+            <a:extLst>
+              <a:ext uri="{28A0092B-C50C-407E-A947-70E740481C1C}">
+                <a14:useLocalDpi xmlns:a14="http://schemas.microsoft.com/office/drawing/2010/main" val="0"/>
+              </a:ext>
+            </a:extLst>
+          </a:blip>
+          <a:stretch>
+            <a:fillRect/>
+          </a:stretch>
+        </p:blipFill>
         <p:spPr>
           <a:xfrm>
-            <a:off x="757367" y="1848356"/>
-            <a:ext cx="9990462" cy="1754326"/>
+            <a:off x="2829388" y="4347146"/>
+            <a:ext cx="2064034" cy="2064034"/>
           </a:xfrm>
           <a:prstGeom prst="rect">
             <a:avLst/>
           </a:prstGeom>
-          <a:noFill/>
         </p:spPr>
-        <p:txBody>
-          <a:bodyPr wrap="square" rtlCol="0">
-            <a:spAutoFit/>
-          </a:bodyPr>
-          <a:lstStyle/>
-          <a:p>
-            <a:endParaRPr lang="es-CL" dirty="0"/>
-          </a:p>
-          <a:p>
-            <a:endParaRPr lang="es-CL" dirty="0"/>
-          </a:p>
-          <a:p>
-            <a:endParaRPr lang="es-CL" dirty="0"/>
-          </a:p>
-          <a:p>
-            <a:endParaRPr lang="es-CL" dirty="0"/>
-          </a:p>
-          <a:p>
-            <a:endParaRPr lang="es-CL" dirty="0"/>
-          </a:p>
-          <a:p>
-            <a:endParaRPr lang="es-CL" dirty="0"/>
-          </a:p>
-        </p:txBody>
-      </p:sp>
-      <p:grpSp>
-        <p:nvGrpSpPr>
-          <p:cNvPr id="10" name="Grupo 9">
+      </p:pic>
+      <p:pic>
+        <p:nvPicPr>
+          <p:cNvPr id="10" name="Imagen 9" descr="Interfaz de usuario gráfica, Texto, Aplicación, Chat o mensaje de texto&#10;&#10;El contenido generado por IA puede ser incorrecto.">
             <a:extLst>
               <a:ext uri="{FF2B5EF4-FFF2-40B4-BE49-F238E27FC236}">
-                <a16:creationId xmlns:a16="http://schemas.microsoft.com/office/drawing/2014/main" id="{B9449F5D-C29B-739A-914E-48A2410E05F2}"/>
+                <a16:creationId xmlns:a16="http://schemas.microsoft.com/office/drawing/2014/main" id="{33FA0EFF-BB44-C7BE-6B8D-C309E3840F77}"/>
               </a:ext>
             </a:extLst>
           </p:cNvPr>
-          <p:cNvGrpSpPr/>
+          <p:cNvPicPr>
+            <a:picLocks noChangeAspect="1"/>
+          </p:cNvPicPr>
           <p:nvPr/>
-        </p:nvGrpSpPr>
-        <p:grpSpPr>
+        </p:nvPicPr>
+        <p:blipFill>
+          <a:blip r:embed="rId3" cstate="print">
+            <a:extLst>
+              <a:ext uri="{28A0092B-C50C-407E-A947-70E740481C1C}">
+                <a14:useLocalDpi xmlns:a14="http://schemas.microsoft.com/office/drawing/2010/main" val="0"/>
+              </a:ext>
+            </a:extLst>
+          </a:blip>
+          <a:stretch>
+            <a:fillRect/>
+          </a:stretch>
+        </p:blipFill>
+        <p:spPr>
           <a:xfrm>
-            <a:off x="520580" y="2356772"/>
-            <a:ext cx="10933103" cy="3929727"/>
-            <a:chOff x="171746" y="2090072"/>
-            <a:chExt cx="10933103" cy="3929727"/>
+            <a:off x="7208139" y="4347146"/>
+            <a:ext cx="2064033" cy="2064033"/>
           </a:xfrm>
-        </p:grpSpPr>
-        <p:pic>
-          <p:nvPicPr>
-            <p:cNvPr id="3" name="Imagen 2" descr="Interfaz de usuario gráfica, Texto, Aplicación, Chat o mensaje de texto&#10;&#10;El contenido generado por IA puede ser incorrecto.">
-              <a:extLst>
-                <a:ext uri="{FF2B5EF4-FFF2-40B4-BE49-F238E27FC236}">
-                  <a16:creationId xmlns:a16="http://schemas.microsoft.com/office/drawing/2014/main" id="{1498D4BC-9B04-C6C3-C3D9-AF63C9E615E6}"/>
-                </a:ext>
-              </a:extLst>
-            </p:cNvPr>
-            <p:cNvPicPr>
-              <a:picLocks noChangeAspect="1"/>
-            </p:cNvPicPr>
-            <p:nvPr/>
-          </p:nvPicPr>
-          <p:blipFill>
-            <a:blip r:embed="rId2">
-              <a:extLst>
-                <a:ext uri="{28A0092B-C50C-407E-A947-70E740481C1C}">
-                  <a14:useLocalDpi xmlns:a14="http://schemas.microsoft.com/office/drawing/2010/main" val="0"/>
-                </a:ext>
-              </a:extLst>
-            </a:blip>
-            <a:stretch>
-              <a:fillRect/>
-            </a:stretch>
-          </p:blipFill>
-          <p:spPr>
-            <a:xfrm>
-              <a:off x="4352967" y="2266650"/>
-              <a:ext cx="3071683" cy="3071683"/>
-            </a:xfrm>
-            <a:prstGeom prst="rect">
-              <a:avLst/>
-            </a:prstGeom>
-          </p:spPr>
-        </p:pic>
-        <p:pic>
-          <p:nvPicPr>
-            <p:cNvPr id="7" name="Imagen 6" descr="Interfaz de usuario gráfica, Texto, Aplicación, Chat o mensaje de texto&#10;&#10;El contenido generado por IA puede ser incorrecto.">
-              <a:extLst>
-                <a:ext uri="{FF2B5EF4-FFF2-40B4-BE49-F238E27FC236}">
-                  <a16:creationId xmlns:a16="http://schemas.microsoft.com/office/drawing/2014/main" id="{E91C03DB-2033-C9AD-7BB8-10A3C9720E23}"/>
-                </a:ext>
-              </a:extLst>
-            </p:cNvPr>
-            <p:cNvPicPr>
-              <a:picLocks noChangeAspect="1"/>
-            </p:cNvPicPr>
-            <p:nvPr/>
-          </p:nvPicPr>
-          <p:blipFill>
-            <a:blip r:embed="rId3">
-              <a:extLst>
-                <a:ext uri="{28A0092B-C50C-407E-A947-70E740481C1C}">
-                  <a14:useLocalDpi xmlns:a14="http://schemas.microsoft.com/office/drawing/2010/main" val="0"/>
-                </a:ext>
-              </a:extLst>
-            </a:blip>
-            <a:stretch>
-              <a:fillRect/>
-            </a:stretch>
-          </p:blipFill>
-          <p:spPr>
-            <a:xfrm>
-              <a:off x="8033166" y="2266651"/>
-              <a:ext cx="3071683" cy="3071683"/>
-            </a:xfrm>
-            <a:prstGeom prst="rect">
-              <a:avLst/>
-            </a:prstGeom>
-          </p:spPr>
-        </p:pic>
-        <p:pic>
-          <p:nvPicPr>
-            <p:cNvPr id="9" name="Imagen 8" descr="Imagen que contiene Texto&#10;&#10;El contenido generado por IA puede ser incorrecto.">
-              <a:extLst>
-                <a:ext uri="{FF2B5EF4-FFF2-40B4-BE49-F238E27FC236}">
-                  <a16:creationId xmlns:a16="http://schemas.microsoft.com/office/drawing/2014/main" id="{CC8AE261-D3A6-173F-F428-91EF4C0D30A2}"/>
-                </a:ext>
-              </a:extLst>
-            </p:cNvPr>
-            <p:cNvPicPr>
-              <a:picLocks noChangeAspect="1"/>
-            </p:cNvPicPr>
-            <p:nvPr/>
-          </p:nvPicPr>
-          <p:blipFill>
-            <a:blip r:embed="rId4">
-              <a:extLst>
-                <a:ext uri="{28A0092B-C50C-407E-A947-70E740481C1C}">
-                  <a14:useLocalDpi xmlns:a14="http://schemas.microsoft.com/office/drawing/2010/main" val="0"/>
-                </a:ext>
-              </a:extLst>
-            </a:blip>
-            <a:stretch>
-              <a:fillRect/>
-            </a:stretch>
-          </p:blipFill>
-          <p:spPr>
-            <a:xfrm>
-              <a:off x="171746" y="2090072"/>
-              <a:ext cx="3929727" cy="3929727"/>
-            </a:xfrm>
-            <a:prstGeom prst="rect">
-              <a:avLst/>
-            </a:prstGeom>
-          </p:spPr>
-        </p:pic>
-      </p:grpSp>
+          <a:prstGeom prst="rect">
+            <a:avLst/>
+          </a:prstGeom>
+        </p:spPr>
+      </p:pic>
+      <p:pic>
+        <p:nvPicPr>
+          <p:cNvPr id="14" name="Imagen 13" descr="Interfaz de usuario gráfica, Texto, Aplicación, Chat o mensaje de texto&#10;&#10;El contenido generado por IA puede ser incorrecto.">
+            <a:extLst>
+              <a:ext uri="{FF2B5EF4-FFF2-40B4-BE49-F238E27FC236}">
+                <a16:creationId xmlns:a16="http://schemas.microsoft.com/office/drawing/2014/main" id="{FA29E3E6-1465-8DD0-AE52-33BB5E0F24A9}"/>
+              </a:ext>
+            </a:extLst>
+          </p:cNvPr>
+          <p:cNvPicPr>
+            <a:picLocks noChangeAspect="1"/>
+          </p:cNvPicPr>
+          <p:nvPr/>
+        </p:nvPicPr>
+        <p:blipFill>
+          <a:blip r:embed="rId4" cstate="print">
+            <a:extLst>
+              <a:ext uri="{28A0092B-C50C-407E-A947-70E740481C1C}">
+                <a14:useLocalDpi xmlns:a14="http://schemas.microsoft.com/office/drawing/2010/main" val="0"/>
+              </a:ext>
+            </a:extLst>
+          </a:blip>
+          <a:stretch>
+            <a:fillRect/>
+          </a:stretch>
+        </p:blipFill>
+        <p:spPr>
+          <a:xfrm>
+            <a:off x="7208139" y="2096094"/>
+            <a:ext cx="2064033" cy="2064033"/>
+          </a:xfrm>
+          <a:prstGeom prst="rect">
+            <a:avLst/>
+          </a:prstGeom>
+        </p:spPr>
+      </p:pic>
+      <p:pic>
+        <p:nvPicPr>
+          <p:cNvPr id="18" name="Imagen 17" descr="Interfaz de usuario gráfica, Texto, Aplicación, Chat o mensaje de texto&#10;&#10;El contenido generado por IA puede ser incorrecto.">
+            <a:extLst>
+              <a:ext uri="{FF2B5EF4-FFF2-40B4-BE49-F238E27FC236}">
+                <a16:creationId xmlns:a16="http://schemas.microsoft.com/office/drawing/2014/main" id="{F88D4542-973F-668E-DD1B-0B59DCE805A8}"/>
+              </a:ext>
+            </a:extLst>
+          </p:cNvPr>
+          <p:cNvPicPr>
+            <a:picLocks noChangeAspect="1"/>
+          </p:cNvPicPr>
+          <p:nvPr/>
+        </p:nvPicPr>
+        <p:blipFill>
+          <a:blip r:embed="rId5" cstate="print">
+            <a:extLst>
+              <a:ext uri="{28A0092B-C50C-407E-A947-70E740481C1C}">
+                <a14:useLocalDpi xmlns:a14="http://schemas.microsoft.com/office/drawing/2010/main" val="0"/>
+              </a:ext>
+            </a:extLst>
+          </a:blip>
+          <a:stretch>
+            <a:fillRect/>
+          </a:stretch>
+        </p:blipFill>
+        <p:spPr>
+          <a:xfrm>
+            <a:off x="5020003" y="4347146"/>
+            <a:ext cx="2064033" cy="2064033"/>
+          </a:xfrm>
+          <a:prstGeom prst="rect">
+            <a:avLst/>
+          </a:prstGeom>
+        </p:spPr>
+      </p:pic>
+      <p:pic>
+        <p:nvPicPr>
+          <p:cNvPr id="22" name="Imagen 21" descr="Interfaz de usuario gráfica, Texto, Aplicación, Chat o mensaje de texto&#10;&#10;El contenido generado por IA puede ser incorrecto.">
+            <a:extLst>
+              <a:ext uri="{FF2B5EF4-FFF2-40B4-BE49-F238E27FC236}">
+                <a16:creationId xmlns:a16="http://schemas.microsoft.com/office/drawing/2014/main" id="{3790A0E5-FD8F-4743-925E-48D19C088DAA}"/>
+              </a:ext>
+            </a:extLst>
+          </p:cNvPr>
+          <p:cNvPicPr>
+            <a:picLocks noChangeAspect="1"/>
+          </p:cNvPicPr>
+          <p:nvPr/>
+        </p:nvPicPr>
+        <p:blipFill>
+          <a:blip r:embed="rId6" cstate="print">
+            <a:extLst>
+              <a:ext uri="{28A0092B-C50C-407E-A947-70E740481C1C}">
+                <a14:useLocalDpi xmlns:a14="http://schemas.microsoft.com/office/drawing/2010/main" val="0"/>
+              </a:ext>
+            </a:extLst>
+          </a:blip>
+          <a:stretch>
+            <a:fillRect/>
+          </a:stretch>
+        </p:blipFill>
+        <p:spPr>
+          <a:xfrm>
+            <a:off x="5020004" y="2096094"/>
+            <a:ext cx="2064033" cy="2064033"/>
+          </a:xfrm>
+          <a:prstGeom prst="rect">
+            <a:avLst/>
+          </a:prstGeom>
+        </p:spPr>
+      </p:pic>
+      <p:pic>
+        <p:nvPicPr>
+          <p:cNvPr id="24" name="Imagen 23" descr="Imagen que contiene Texto&#10;&#10;El contenido generado por IA puede ser incorrecto.">
+            <a:extLst>
+              <a:ext uri="{FF2B5EF4-FFF2-40B4-BE49-F238E27FC236}">
+                <a16:creationId xmlns:a16="http://schemas.microsoft.com/office/drawing/2014/main" id="{D3932C9C-C298-3F56-07A4-F55246BE9FFD}"/>
+              </a:ext>
+            </a:extLst>
+          </p:cNvPr>
+          <p:cNvPicPr>
+            <a:picLocks noChangeAspect="1"/>
+          </p:cNvPicPr>
+          <p:nvPr/>
+        </p:nvPicPr>
+        <p:blipFill>
+          <a:blip r:embed="rId7" cstate="print">
+            <a:extLst>
+              <a:ext uri="{28A0092B-C50C-407E-A947-70E740481C1C}">
+                <a14:useLocalDpi xmlns:a14="http://schemas.microsoft.com/office/drawing/2010/main" val="0"/>
+              </a:ext>
+            </a:extLst>
+          </a:blip>
+          <a:stretch>
+            <a:fillRect/>
+          </a:stretch>
+        </p:blipFill>
+        <p:spPr>
+          <a:xfrm>
+            <a:off x="9486715" y="3429000"/>
+            <a:ext cx="2064033" cy="2064033"/>
+          </a:xfrm>
+          <a:prstGeom prst="rect">
+            <a:avLst/>
+          </a:prstGeom>
+        </p:spPr>
+      </p:pic>
+      <p:pic>
+        <p:nvPicPr>
+          <p:cNvPr id="26" name="Imagen 25" descr="Interfaz de usuario gráfica, Texto, Aplicación, Chat o mensaje de texto&#10;&#10;El contenido generado por IA puede ser incorrecto.">
+            <a:extLst>
+              <a:ext uri="{FF2B5EF4-FFF2-40B4-BE49-F238E27FC236}">
+                <a16:creationId xmlns:a16="http://schemas.microsoft.com/office/drawing/2014/main" id="{A6C5A9CE-9BD4-C7B6-5D2C-A19E8603D8CA}"/>
+              </a:ext>
+            </a:extLst>
+          </p:cNvPr>
+          <p:cNvPicPr>
+            <a:picLocks noChangeAspect="1"/>
+          </p:cNvPicPr>
+          <p:nvPr/>
+        </p:nvPicPr>
+        <p:blipFill>
+          <a:blip r:embed="rId8" cstate="print">
+            <a:extLst>
+              <a:ext uri="{28A0092B-C50C-407E-A947-70E740481C1C}">
+                <a14:useLocalDpi xmlns:a14="http://schemas.microsoft.com/office/drawing/2010/main" val="0"/>
+              </a:ext>
+            </a:extLst>
+          </a:blip>
+          <a:stretch>
+            <a:fillRect/>
+          </a:stretch>
+        </p:blipFill>
+        <p:spPr>
+          <a:xfrm>
+            <a:off x="2830628" y="2096095"/>
+            <a:ext cx="2064033" cy="2064033"/>
+          </a:xfrm>
+          <a:prstGeom prst="rect">
+            <a:avLst/>
+          </a:prstGeom>
+        </p:spPr>
+      </p:pic>
+      <p:pic>
+        <p:nvPicPr>
+          <p:cNvPr id="28" name="Imagen 27" descr="Interfaz de usuario gráfica&#10;&#10;El contenido generado por IA puede ser incorrecto.">
+            <a:extLst>
+              <a:ext uri="{FF2B5EF4-FFF2-40B4-BE49-F238E27FC236}">
+                <a16:creationId xmlns:a16="http://schemas.microsoft.com/office/drawing/2014/main" id="{7CE4026D-3754-B08A-AC7B-59B172040BA8}"/>
+              </a:ext>
+            </a:extLst>
+          </p:cNvPr>
+          <p:cNvPicPr>
+            <a:picLocks noChangeAspect="1"/>
+          </p:cNvPicPr>
+          <p:nvPr/>
+        </p:nvPicPr>
+        <p:blipFill>
+          <a:blip r:embed="rId9" cstate="print">
+            <a:extLst>
+              <a:ext uri="{28A0092B-C50C-407E-A947-70E740481C1C}">
+                <a14:useLocalDpi xmlns:a14="http://schemas.microsoft.com/office/drawing/2010/main" val="0"/>
+              </a:ext>
+            </a:extLst>
+          </a:blip>
+          <a:stretch>
+            <a:fillRect/>
+          </a:stretch>
+        </p:blipFill>
+        <p:spPr>
+          <a:xfrm>
+            <a:off x="641252" y="4347146"/>
+            <a:ext cx="2064033" cy="2064033"/>
+          </a:xfrm>
+          <a:prstGeom prst="rect">
+            <a:avLst/>
+          </a:prstGeom>
+        </p:spPr>
+      </p:pic>
+      <p:pic>
+        <p:nvPicPr>
+          <p:cNvPr id="30" name="Imagen 29" descr="Interfaz de usuario gráfica, Texto, Aplicación&#10;&#10;El contenido generado por IA puede ser incorrecto.">
+            <a:extLst>
+              <a:ext uri="{FF2B5EF4-FFF2-40B4-BE49-F238E27FC236}">
+                <a16:creationId xmlns:a16="http://schemas.microsoft.com/office/drawing/2014/main" id="{399A898C-2877-FBEE-BACB-5F7548903218}"/>
+              </a:ext>
+            </a:extLst>
+          </p:cNvPr>
+          <p:cNvPicPr>
+            <a:picLocks noChangeAspect="1"/>
+          </p:cNvPicPr>
+          <p:nvPr/>
+        </p:nvPicPr>
+        <p:blipFill>
+          <a:blip r:embed="rId10" cstate="print">
+            <a:extLst>
+              <a:ext uri="{28A0092B-C50C-407E-A947-70E740481C1C}">
+                <a14:useLocalDpi xmlns:a14="http://schemas.microsoft.com/office/drawing/2010/main" val="0"/>
+              </a:ext>
+            </a:extLst>
+          </a:blip>
+          <a:stretch>
+            <a:fillRect/>
+          </a:stretch>
+        </p:blipFill>
+        <p:spPr>
+          <a:xfrm>
+            <a:off x="641252" y="2096095"/>
+            <a:ext cx="2064033" cy="2064033"/>
+          </a:xfrm>
+          <a:prstGeom prst="rect">
+            <a:avLst/>
+          </a:prstGeom>
+        </p:spPr>
+      </p:pic>
     </p:spTree>
     <p:extLst>
       <p:ext uri="{BB962C8B-B14F-4D97-AF65-F5344CB8AC3E}">
-        <p14:creationId xmlns:p14="http://schemas.microsoft.com/office/powerpoint/2010/main" val="1033991445"/>
+        <p14:creationId xmlns:p14="http://schemas.microsoft.com/office/powerpoint/2010/main" val="2541397896"/>
       </p:ext>
     </p:extLst>
   </p:cSld>

</xml_diff>